<commit_message>
added a couple last bits
</commit_message>
<xml_diff>
--- a/2018/24 HoP/PowerShell.pptx
+++ b/2018/24 HoP/PowerShell.pptx
@@ -206,7 +206,7 @@
   <pc:docChgLst>
     <pc:chgData name="Rob Sewell" userId="c802df42025d5e1f" providerId="LiveId" clId="{0F4BF76D-F7F5-46E4-94E5-409F1B9EB435}"/>
     <pc:docChg chg="undo redo custSel addSld delSld modSld sldOrd modSection">
-      <pc:chgData name="Rob Sewell" userId="c802df42025d5e1f" providerId="LiveId" clId="{0F4BF76D-F7F5-46E4-94E5-409F1B9EB435}" dt="2018-06-12T11:05:04.191" v="1288" actId="1076"/>
+      <pc:chgData name="Rob Sewell" userId="c802df42025d5e1f" providerId="LiveId" clId="{0F4BF76D-F7F5-46E4-94E5-409F1B9EB435}" dt="2018-06-12T11:32:12.034" v="1304" actId="20577"/>
       <pc:docMkLst>
         <pc:docMk/>
       </pc:docMkLst>
@@ -726,13 +726,13 @@
         </pc:sldMkLst>
       </pc:sldChg>
       <pc:sldChg chg="addSp delSp modSp ord">
-        <pc:chgData name="Rob Sewell" userId="c802df42025d5e1f" providerId="LiveId" clId="{0F4BF76D-F7F5-46E4-94E5-409F1B9EB435}" dt="2018-06-11T12:47:51.710" v="542" actId="2696"/>
+        <pc:chgData name="Rob Sewell" userId="c802df42025d5e1f" providerId="LiveId" clId="{0F4BF76D-F7F5-46E4-94E5-409F1B9EB435}" dt="2018-06-12T11:32:12.034" v="1304" actId="20577"/>
         <pc:sldMkLst>
           <pc:docMk/>
           <pc:sldMk cId="3360030024" sldId="327"/>
         </pc:sldMkLst>
         <pc:spChg chg="mod">
-          <ac:chgData name="Rob Sewell" userId="c802df42025d5e1f" providerId="LiveId" clId="{0F4BF76D-F7F5-46E4-94E5-409F1B9EB435}" dt="2018-06-11T12:25:30.814" v="349" actId="20577"/>
+          <ac:chgData name="Rob Sewell" userId="c802df42025d5e1f" providerId="LiveId" clId="{0F4BF76D-F7F5-46E4-94E5-409F1B9EB435}" dt="2018-06-12T11:32:12.034" v="1304" actId="20577"/>
           <ac:spMkLst>
             <pc:docMk/>
             <pc:sldMk cId="3360030024" sldId="327"/>
@@ -32800,9 +32800,10 @@
           <a:lstStyle/>
           <a:p>
             <a:r>
-              <a:rPr lang="en-US" dirty="0"/>
-              <a:t>Writing PowerShell Code</a:t>
-            </a:r>
+              <a:rPr lang="en-US"/>
+              <a:t>PowerShell Code Editors</a:t>
+            </a:r>
+            <a:endParaRPr lang="en-US" dirty="0"/>
           </a:p>
         </p:txBody>
       </p:sp>

</xml_diff>